<commit_message>
update doc and typo
</commit_message>
<xml_diff>
--- a/documents/validating_define-xml.pptx
+++ b/documents/validating_define-xml.pptx
@@ -1,6 +1,6 @@
 
 <file path=ppt/presentation.xml><?xml version="1.0" encoding="utf-8"?>
-<p:presentation xmlns:a="http://schemas.openxmlformats.org/drawingml/2006/main" xmlns:r="http://schemas.openxmlformats.org/officeDocument/2006/relationships" xmlns:p="http://schemas.openxmlformats.org/presentationml/2006/main" showSpecialPlsOnTitleSld="0" removePersonalInfoOnSave="1" embedTrueTypeFonts="1" saveSubsetFonts="1">
+<p:presentation xmlns:a="http://schemas.openxmlformats.org/drawingml/2006/main" xmlns:r="http://schemas.openxmlformats.org/officeDocument/2006/relationships" xmlns:p="http://schemas.openxmlformats.org/presentationml/2006/main" showSpecialPlsOnTitleSld="0" embedTrueTypeFonts="1" saveSubsetFonts="1">
   <p:sldMasterIdLst>
     <p:sldMasterId id="2147483866" r:id="rId1"/>
     <p:sldMasterId id="2147486480" r:id="rId2"/>
@@ -16445,7 +16445,7 @@
           <a:p>
             <a:r>
               <a:rPr lang="en-US"/>
-              <a:t>2023-11-16</a:t>
+              <a:t>2025-11-03</a:t>
             </a:r>
           </a:p>
         </p:txBody>
@@ -17531,7 +17531,7 @@
               <a:rPr lang="en-US">
                 <a:hlinkClick r:id="rId4"/>
               </a:rPr>
-              <a:t>https://github.com/schxslt/schxslt</a:t>
+              <a:t>https://codeberg.org/SchXslt/schxslt</a:t>
             </a:r>
             <a:br>
               <a:rPr lang="en-US"/>

</xml_diff>